<commit_message>
Added getter and setter exercises
</commit_message>
<xml_diff>
--- a/diagrams/Intro To Object Oriented Programming.pptx
+++ b/diagrams/Intro To Object Oriented Programming.pptx
@@ -5,27 +5,28 @@
     <p:sldMasterId id="2147483659" r:id="rId1"/>
   </p:sldMasterIdLst>
   <p:notesMasterIdLst>
-    <p:notesMasterId r:id="rId12"/>
+    <p:notesMasterId r:id="rId13"/>
   </p:notesMasterIdLst>
   <p:sldIdLst>
     <p:sldId id="256" r:id="rId2"/>
     <p:sldId id="257" r:id="rId3"/>
-    <p:sldId id="258" r:id="rId4"/>
-    <p:sldId id="259" r:id="rId5"/>
-    <p:sldId id="260" r:id="rId6"/>
-    <p:sldId id="261" r:id="rId7"/>
-    <p:sldId id="262" r:id="rId8"/>
-    <p:sldId id="263" r:id="rId9"/>
-    <p:sldId id="264" r:id="rId10"/>
-    <p:sldId id="268" r:id="rId11"/>
+    <p:sldId id="259" r:id="rId4"/>
+    <p:sldId id="258" r:id="rId5"/>
+    <p:sldId id="261" r:id="rId6"/>
+    <p:sldId id="260" r:id="rId7"/>
+    <p:sldId id="269" r:id="rId8"/>
+    <p:sldId id="262" r:id="rId9"/>
+    <p:sldId id="263" r:id="rId10"/>
+    <p:sldId id="264" r:id="rId11"/>
+    <p:sldId id="268" r:id="rId12"/>
   </p:sldIdLst>
   <p:sldSz cx="9144000" cy="5143500" type="screen16x9"/>
   <p:notesSz cx="6858000" cy="9144000"/>
   <p:embeddedFontLst>
     <p:embeddedFont>
       <p:font typeface="Gill Sans" panose="020B0604020202020204" charset="0"/>
-      <p:regular r:id="rId13"/>
-      <p:bold r:id="rId14"/>
+      <p:regular r:id="rId14"/>
+      <p:bold r:id="rId15"/>
     </p:embeddedFont>
   </p:embeddedFontLst>
   <p:defaultTextStyle>
@@ -826,6 +827,110 @@
   <p:cSld>
     <p:spTree>
       <p:nvGrpSpPr>
+        <p:cNvPr id="1" name="Shape 145"/>
+        <p:cNvGrpSpPr/>
+        <p:nvPr/>
+      </p:nvGrpSpPr>
+      <p:grpSpPr>
+        <a:xfrm>
+          <a:off x="0" y="0"/>
+          <a:ext cx="0" cy="0"/>
+          <a:chOff x="0" y="0"/>
+          <a:chExt cx="0" cy="0"/>
+        </a:xfrm>
+      </p:grpSpPr>
+      <p:sp>
+        <p:nvSpPr>
+          <p:cNvPr id="146" name="Google Shape;146;g3f7ec1d4ea_0_87:notes"/>
+          <p:cNvSpPr>
+            <a:spLocks noGrp="1" noRot="1" noChangeAspect="1"/>
+          </p:cNvSpPr>
+          <p:nvPr>
+            <p:ph type="sldImg" idx="2"/>
+          </p:nvPr>
+        </p:nvSpPr>
+        <p:spPr>
+          <a:xfrm>
+            <a:off x="381300" y="685800"/>
+            <a:ext cx="6096000" cy="3429000"/>
+          </a:xfrm>
+          <a:custGeom>
+            <a:avLst/>
+            <a:gdLst/>
+            <a:ahLst/>
+            <a:cxnLst/>
+            <a:rect l="l" t="t" r="r" b="b"/>
+            <a:pathLst>
+              <a:path w="120000" h="120000" extrusionOk="0">
+                <a:moveTo>
+                  <a:pt x="0" y="0"/>
+                </a:moveTo>
+                <a:lnTo>
+                  <a:pt x="120000" y="0"/>
+                </a:lnTo>
+                <a:lnTo>
+                  <a:pt x="120000" y="120000"/>
+                </a:lnTo>
+                <a:lnTo>
+                  <a:pt x="0" y="120000"/>
+                </a:lnTo>
+                <a:close/>
+              </a:path>
+            </a:pathLst>
+          </a:custGeom>
+        </p:spPr>
+      </p:sp>
+      <p:sp>
+        <p:nvSpPr>
+          <p:cNvPr id="147" name="Google Shape;147;g3f7ec1d4ea_0_87:notes"/>
+          <p:cNvSpPr txBox="1">
+            <a:spLocks noGrp="1"/>
+          </p:cNvSpPr>
+          <p:nvPr>
+            <p:ph type="body" idx="1"/>
+          </p:nvPr>
+        </p:nvSpPr>
+        <p:spPr>
+          <a:xfrm>
+            <a:off x="685800" y="4343400"/>
+            <a:ext cx="5486400" cy="4114800"/>
+          </a:xfrm>
+          <a:prstGeom prst="rect">
+            <a:avLst/>
+          </a:prstGeom>
+        </p:spPr>
+        <p:txBody>
+          <a:bodyPr spcFirstLastPara="1" wrap="square" lIns="91425" tIns="91425" rIns="91425" bIns="91425" anchor="t" anchorCtr="0">
+            <a:noAutofit/>
+          </a:bodyPr>
+          <a:lstStyle/>
+          <a:p>
+            <a:pPr marL="0" lvl="0" indent="0" algn="l" rtl="0">
+              <a:spcBef>
+                <a:spcPts val="0"/>
+              </a:spcBef>
+              <a:spcAft>
+                <a:spcPts val="0"/>
+              </a:spcAft>
+              <a:buNone/>
+            </a:pPr>
+            <a:endParaRPr/>
+          </a:p>
+        </p:txBody>
+      </p:sp>
+    </p:spTree>
+  </p:cSld>
+  <p:clrMapOvr>
+    <a:masterClrMapping/>
+  </p:clrMapOvr>
+</p:notes>
+</file>
+
+<file path=ppt/notesSlides/notesSlide11.xml><?xml version="1.0" encoding="utf-8"?>
+<p:notes xmlns:a="http://schemas.openxmlformats.org/drawingml/2006/main" xmlns:r="http://schemas.openxmlformats.org/officeDocument/2006/relationships" xmlns:p="http://schemas.openxmlformats.org/presentationml/2006/main" showMasterSp="0" showMasterPhAnim="0">
+  <p:cSld>
+    <p:spTree>
+      <p:nvGrpSpPr>
         <p:cNvPr id="1" name="Shape 196"/>
         <p:cNvGrpSpPr/>
         <p:nvPr/>
@@ -1034,6 +1139,110 @@
   <p:cSld>
     <p:spTree>
       <p:nvGrpSpPr>
+        <p:cNvPr id="1" name="Shape 88"/>
+        <p:cNvGrpSpPr/>
+        <p:nvPr/>
+      </p:nvGrpSpPr>
+      <p:grpSpPr>
+        <a:xfrm>
+          <a:off x="0" y="0"/>
+          <a:ext cx="0" cy="0"/>
+          <a:chOff x="0" y="0"/>
+          <a:chExt cx="0" cy="0"/>
+        </a:xfrm>
+      </p:grpSpPr>
+      <p:sp>
+        <p:nvSpPr>
+          <p:cNvPr id="89" name="Google Shape;89;g3f7ec1d4ea_0_35:notes"/>
+          <p:cNvSpPr>
+            <a:spLocks noGrp="1" noRot="1" noChangeAspect="1"/>
+          </p:cNvSpPr>
+          <p:nvPr>
+            <p:ph type="sldImg" idx="2"/>
+          </p:nvPr>
+        </p:nvSpPr>
+        <p:spPr>
+          <a:xfrm>
+            <a:off x="381000" y="685800"/>
+            <a:ext cx="6096000" cy="3429000"/>
+          </a:xfrm>
+          <a:custGeom>
+            <a:avLst/>
+            <a:gdLst/>
+            <a:ahLst/>
+            <a:cxnLst/>
+            <a:rect l="l" t="t" r="r" b="b"/>
+            <a:pathLst>
+              <a:path w="120000" h="120000" extrusionOk="0">
+                <a:moveTo>
+                  <a:pt x="0" y="0"/>
+                </a:moveTo>
+                <a:lnTo>
+                  <a:pt x="120000" y="0"/>
+                </a:lnTo>
+                <a:lnTo>
+                  <a:pt x="120000" y="120000"/>
+                </a:lnTo>
+                <a:lnTo>
+                  <a:pt x="0" y="120000"/>
+                </a:lnTo>
+                <a:close/>
+              </a:path>
+            </a:pathLst>
+          </a:custGeom>
+        </p:spPr>
+      </p:sp>
+      <p:sp>
+        <p:nvSpPr>
+          <p:cNvPr id="90" name="Google Shape;90;g3f7ec1d4ea_0_35:notes"/>
+          <p:cNvSpPr txBox="1">
+            <a:spLocks noGrp="1"/>
+          </p:cNvSpPr>
+          <p:nvPr>
+            <p:ph type="body" idx="1"/>
+          </p:nvPr>
+        </p:nvSpPr>
+        <p:spPr>
+          <a:xfrm>
+            <a:off x="685800" y="4343400"/>
+            <a:ext cx="5486400" cy="4114800"/>
+          </a:xfrm>
+          <a:prstGeom prst="rect">
+            <a:avLst/>
+          </a:prstGeom>
+        </p:spPr>
+        <p:txBody>
+          <a:bodyPr spcFirstLastPara="1" wrap="square" lIns="91425" tIns="91425" rIns="91425" bIns="91425" anchor="t" anchorCtr="0">
+            <a:noAutofit/>
+          </a:bodyPr>
+          <a:lstStyle/>
+          <a:p>
+            <a:pPr marL="0" lvl="0" indent="0" algn="l" rtl="0">
+              <a:spcBef>
+                <a:spcPts val="0"/>
+              </a:spcBef>
+              <a:spcAft>
+                <a:spcPts val="0"/>
+              </a:spcAft>
+              <a:buNone/>
+            </a:pPr>
+            <a:endParaRPr/>
+          </a:p>
+        </p:txBody>
+      </p:sp>
+    </p:spTree>
+  </p:cSld>
+  <p:clrMapOvr>
+    <a:masterClrMapping/>
+  </p:clrMapOvr>
+</p:notes>
+</file>
+
+<file path=ppt/notesSlides/notesSlide4.xml><?xml version="1.0" encoding="utf-8"?>
+<p:notes xmlns:a="http://schemas.openxmlformats.org/drawingml/2006/main" xmlns:r="http://schemas.openxmlformats.org/officeDocument/2006/relationships" xmlns:p="http://schemas.openxmlformats.org/presentationml/2006/main" showMasterSp="0" showMasterPhAnim="0">
+  <p:cSld>
+    <p:spTree>
+      <p:nvGrpSpPr>
         <p:cNvPr id="1" name="Shape 76"/>
         <p:cNvGrpSpPr/>
         <p:nvPr/>
@@ -1133,12 +1342,12 @@
 </p:notes>
 </file>
 
-<file path=ppt/notesSlides/notesSlide4.xml><?xml version="1.0" encoding="utf-8"?>
+<file path=ppt/notesSlides/notesSlide5.xml><?xml version="1.0" encoding="utf-8"?>
 <p:notes xmlns:a="http://schemas.openxmlformats.org/drawingml/2006/main" xmlns:r="http://schemas.openxmlformats.org/officeDocument/2006/relationships" xmlns:p="http://schemas.openxmlformats.org/presentationml/2006/main" showMasterSp="0" showMasterPhAnim="0">
   <p:cSld>
     <p:spTree>
       <p:nvGrpSpPr>
-        <p:cNvPr id="1" name="Shape 88"/>
+        <p:cNvPr id="1" name="Shape 113"/>
         <p:cNvGrpSpPr/>
         <p:nvPr/>
       </p:nvGrpSpPr>
@@ -1152,7 +1361,7 @@
       </p:grpSpPr>
       <p:sp>
         <p:nvSpPr>
-          <p:cNvPr id="89" name="Google Shape;89;g3f7ec1d4ea_0_35:notes"/>
+          <p:cNvPr id="114" name="Google Shape;114;g3f7ec1d4ea_0_58:notes"/>
           <p:cNvSpPr>
             <a:spLocks noGrp="1" noRot="1" noChangeAspect="1"/>
           </p:cNvSpPr>
@@ -1193,7 +1402,7 @@
       </p:sp>
       <p:sp>
         <p:nvSpPr>
-          <p:cNvPr id="90" name="Google Shape;90;g3f7ec1d4ea_0_35:notes"/>
+          <p:cNvPr id="115" name="Google Shape;115;g3f7ec1d4ea_0_58:notes"/>
           <p:cNvSpPr txBox="1">
             <a:spLocks noGrp="1"/>
           </p:cNvSpPr>
@@ -1237,7 +1446,7 @@
 </p:notes>
 </file>
 
-<file path=ppt/notesSlides/notesSlide5.xml><?xml version="1.0" encoding="utf-8"?>
+<file path=ppt/notesSlides/notesSlide6.xml><?xml version="1.0" encoding="utf-8"?>
 <p:notes xmlns:a="http://schemas.openxmlformats.org/drawingml/2006/main" xmlns:r="http://schemas.openxmlformats.org/officeDocument/2006/relationships" xmlns:p="http://schemas.openxmlformats.org/presentationml/2006/main" showMasterSp="0" showMasterPhAnim="0">
   <p:cSld>
     <p:spTree>
@@ -1341,7 +1550,7 @@
 </p:notes>
 </file>
 
-<file path=ppt/notesSlides/notesSlide6.xml><?xml version="1.0" encoding="utf-8"?>
+<file path=ppt/notesSlides/notesSlide7.xml><?xml version="1.0" encoding="utf-8"?>
 <p:notes xmlns:a="http://schemas.openxmlformats.org/drawingml/2006/main" xmlns:r="http://schemas.openxmlformats.org/officeDocument/2006/relationships" xmlns:p="http://schemas.openxmlformats.org/presentationml/2006/main" showMasterSp="0" showMasterPhAnim="0">
   <p:cSld>
     <p:spTree>
@@ -1438,6 +1647,11 @@
         </p:txBody>
       </p:sp>
     </p:spTree>
+    <p:extLst>
+      <p:ext uri="{BB962C8B-B14F-4D97-AF65-F5344CB8AC3E}">
+        <p14:creationId xmlns:p14="http://schemas.microsoft.com/office/powerpoint/2010/main" val="2160947477"/>
+      </p:ext>
+    </p:extLst>
   </p:cSld>
   <p:clrMapOvr>
     <a:masterClrMapping/>
@@ -1445,7 +1659,7 @@
 </p:notes>
 </file>
 
-<file path=ppt/notesSlides/notesSlide7.xml><?xml version="1.0" encoding="utf-8"?>
+<file path=ppt/notesSlides/notesSlide8.xml><?xml version="1.0" encoding="utf-8"?>
 <p:notes xmlns:a="http://schemas.openxmlformats.org/drawingml/2006/main" xmlns:r="http://schemas.openxmlformats.org/officeDocument/2006/relationships" xmlns:p="http://schemas.openxmlformats.org/presentationml/2006/main" showMasterSp="0" showMasterPhAnim="0">
   <p:cSld>
     <p:spTree>
@@ -1549,7 +1763,7 @@
 </p:notes>
 </file>
 
-<file path=ppt/notesSlides/notesSlide8.xml><?xml version="1.0" encoding="utf-8"?>
+<file path=ppt/notesSlides/notesSlide9.xml><?xml version="1.0" encoding="utf-8"?>
 <p:notes xmlns:a="http://schemas.openxmlformats.org/drawingml/2006/main" xmlns:r="http://schemas.openxmlformats.org/officeDocument/2006/relationships" xmlns:p="http://schemas.openxmlformats.org/presentationml/2006/main" showMasterSp="0" showMasterPhAnim="0">
   <p:cSld>
     <p:spTree>
@@ -1610,110 +1824,6 @@
       <p:sp>
         <p:nvSpPr>
           <p:cNvPr id="136" name="Google Shape;136;g3f7ec1d4ea_0_77:notes"/>
-          <p:cNvSpPr txBox="1">
-            <a:spLocks noGrp="1"/>
-          </p:cNvSpPr>
-          <p:nvPr>
-            <p:ph type="body" idx="1"/>
-          </p:nvPr>
-        </p:nvSpPr>
-        <p:spPr>
-          <a:xfrm>
-            <a:off x="685800" y="4343400"/>
-            <a:ext cx="5486400" cy="4114800"/>
-          </a:xfrm>
-          <a:prstGeom prst="rect">
-            <a:avLst/>
-          </a:prstGeom>
-        </p:spPr>
-        <p:txBody>
-          <a:bodyPr spcFirstLastPara="1" wrap="square" lIns="91425" tIns="91425" rIns="91425" bIns="91425" anchor="t" anchorCtr="0">
-            <a:noAutofit/>
-          </a:bodyPr>
-          <a:lstStyle/>
-          <a:p>
-            <a:pPr marL="0" lvl="0" indent="0" algn="l" rtl="0">
-              <a:spcBef>
-                <a:spcPts val="0"/>
-              </a:spcBef>
-              <a:spcAft>
-                <a:spcPts val="0"/>
-              </a:spcAft>
-              <a:buNone/>
-            </a:pPr>
-            <a:endParaRPr/>
-          </a:p>
-        </p:txBody>
-      </p:sp>
-    </p:spTree>
-  </p:cSld>
-  <p:clrMapOvr>
-    <a:masterClrMapping/>
-  </p:clrMapOvr>
-</p:notes>
-</file>
-
-<file path=ppt/notesSlides/notesSlide9.xml><?xml version="1.0" encoding="utf-8"?>
-<p:notes xmlns:a="http://schemas.openxmlformats.org/drawingml/2006/main" xmlns:r="http://schemas.openxmlformats.org/officeDocument/2006/relationships" xmlns:p="http://schemas.openxmlformats.org/presentationml/2006/main" showMasterSp="0" showMasterPhAnim="0">
-  <p:cSld>
-    <p:spTree>
-      <p:nvGrpSpPr>
-        <p:cNvPr id="1" name="Shape 145"/>
-        <p:cNvGrpSpPr/>
-        <p:nvPr/>
-      </p:nvGrpSpPr>
-      <p:grpSpPr>
-        <a:xfrm>
-          <a:off x="0" y="0"/>
-          <a:ext cx="0" cy="0"/>
-          <a:chOff x="0" y="0"/>
-          <a:chExt cx="0" cy="0"/>
-        </a:xfrm>
-      </p:grpSpPr>
-      <p:sp>
-        <p:nvSpPr>
-          <p:cNvPr id="146" name="Google Shape;146;g3f7ec1d4ea_0_87:notes"/>
-          <p:cNvSpPr>
-            <a:spLocks noGrp="1" noRot="1" noChangeAspect="1"/>
-          </p:cNvSpPr>
-          <p:nvPr>
-            <p:ph type="sldImg" idx="2"/>
-          </p:nvPr>
-        </p:nvSpPr>
-        <p:spPr>
-          <a:xfrm>
-            <a:off x="381300" y="685800"/>
-            <a:ext cx="6096000" cy="3429000"/>
-          </a:xfrm>
-          <a:custGeom>
-            <a:avLst/>
-            <a:gdLst/>
-            <a:ahLst/>
-            <a:cxnLst/>
-            <a:rect l="l" t="t" r="r" b="b"/>
-            <a:pathLst>
-              <a:path w="120000" h="120000" extrusionOk="0">
-                <a:moveTo>
-                  <a:pt x="0" y="0"/>
-                </a:moveTo>
-                <a:lnTo>
-                  <a:pt x="120000" y="0"/>
-                </a:lnTo>
-                <a:lnTo>
-                  <a:pt x="120000" y="120000"/>
-                </a:lnTo>
-                <a:lnTo>
-                  <a:pt x="0" y="120000"/>
-                </a:lnTo>
-                <a:close/>
-              </a:path>
-            </a:pathLst>
-          </a:custGeom>
-        </p:spPr>
-      </p:sp>
-      <p:sp>
-        <p:nvSpPr>
-          <p:cNvPr id="147" name="Google Shape;147;g3f7ec1d4ea_0_87:notes"/>
           <p:cNvSpPr txBox="1">
             <a:spLocks noGrp="1"/>
           </p:cNvSpPr>
@@ -6595,19 +6705,19 @@
                 <a:cs typeface="Gill Sans"/>
                 <a:sym typeface="Gill Sans"/>
               </a:rPr>
-              <a:t>Objects &amp; Arrays </a:t>
+              <a:t>Intro To Object Oriented Programming</a:t>
             </a:r>
-          </a:p>
-          <a:p>
-            <a:pPr marL="0" lvl="0" indent="0" algn="l" rtl="0">
-              <a:spcBef>
-                <a:spcPts val="0"/>
-              </a:spcBef>
-              <a:spcAft>
-                <a:spcPts val="0"/>
-              </a:spcAft>
-              <a:buNone/>
-            </a:pPr>
+            <a:br>
+              <a:rPr lang="en-US" sz="2000" dirty="0">
+                <a:solidFill>
+                  <a:srgbClr val="649E8F"/>
+                </a:solidFill>
+                <a:latin typeface="Gill Sans"/>
+                <a:ea typeface="Gill Sans"/>
+                <a:cs typeface="Gill Sans"/>
+                <a:sym typeface="Gill Sans"/>
+              </a:rPr>
+            </a:br>
             <a:r>
               <a:rPr lang="en-US" sz="1500" dirty="0">
                 <a:solidFill>
@@ -6618,7 +6728,7 @@
                 <a:cs typeface="Gill Sans"/>
                 <a:sym typeface="Gill Sans"/>
               </a:rPr>
-              <a:t>Working with complex data types </a:t>
+              <a:t>A new “programming paradigm”</a:t>
             </a:r>
           </a:p>
           <a:p>
@@ -6661,7 +6771,7 @@
                 <a:cs typeface="Gill Sans"/>
                 <a:sym typeface="Gill Sans"/>
               </a:rPr>
-              <a:t>29 SEPTEMBER | XOLA DOS SANTOS</a:t>
+              <a:t>XOLA DOS SANTOS</a:t>
             </a:r>
             <a:endParaRPr dirty="0">
               <a:solidFill>
@@ -6868,6 +6978,215 @@
 </file>
 
 <file path=ppt/slides/slide10.xml><?xml version="1.0" encoding="utf-8"?>
+<p:sld xmlns:a="http://schemas.openxmlformats.org/drawingml/2006/main" xmlns:r="http://schemas.openxmlformats.org/officeDocument/2006/relationships" xmlns:p="http://schemas.openxmlformats.org/presentationml/2006/main">
+  <p:cSld>
+    <p:spTree>
+      <p:nvGrpSpPr>
+        <p:cNvPr id="1" name="Shape 148"/>
+        <p:cNvGrpSpPr/>
+        <p:nvPr/>
+      </p:nvGrpSpPr>
+      <p:grpSpPr>
+        <a:xfrm>
+          <a:off x="0" y="0"/>
+          <a:ext cx="0" cy="0"/>
+          <a:chOff x="0" y="0"/>
+          <a:chExt cx="0" cy="0"/>
+        </a:xfrm>
+      </p:grpSpPr>
+      <p:pic>
+        <p:nvPicPr>
+          <p:cNvPr id="149" name="Google Shape;149;p21"/>
+          <p:cNvPicPr preferRelativeResize="0"/>
+          <p:nvPr/>
+        </p:nvPicPr>
+        <p:blipFill>
+          <a:blip r:embed="rId3">
+            <a:alphaModFix/>
+          </a:blip>
+          <a:stretch>
+            <a:fillRect/>
+          </a:stretch>
+        </p:blipFill>
+        <p:spPr>
+          <a:xfrm>
+            <a:off x="0" y="0"/>
+            <a:ext cx="9144000" cy="5143500"/>
+          </a:xfrm>
+          <a:prstGeom prst="rect">
+            <a:avLst/>
+          </a:prstGeom>
+          <a:noFill/>
+          <a:ln>
+            <a:noFill/>
+          </a:ln>
+        </p:spPr>
+      </p:pic>
+      <p:sp>
+        <p:nvSpPr>
+          <p:cNvPr id="150" name="Google Shape;150;p21"/>
+          <p:cNvSpPr/>
+          <p:nvPr/>
+        </p:nvSpPr>
+        <p:spPr>
+          <a:xfrm>
+            <a:off x="0" y="4880100"/>
+            <a:ext cx="9144000" cy="263400"/>
+          </a:xfrm>
+          <a:prstGeom prst="rect">
+            <a:avLst/>
+          </a:prstGeom>
+          <a:solidFill>
+            <a:srgbClr val="649E8F"/>
+          </a:solidFill>
+          <a:ln w="9525" cap="flat" cmpd="sng">
+            <a:solidFill>
+              <a:srgbClr val="649E8F"/>
+            </a:solidFill>
+            <a:prstDash val="solid"/>
+            <a:round/>
+            <a:headEnd type="none" w="sm" len="sm"/>
+            <a:tailEnd type="none" w="sm" len="sm"/>
+          </a:ln>
+        </p:spPr>
+        <p:txBody>
+          <a:bodyPr spcFirstLastPara="1" wrap="square" lIns="91425" tIns="91425" rIns="91425" bIns="91425" anchor="ctr" anchorCtr="0">
+            <a:noAutofit/>
+          </a:bodyPr>
+          <a:lstStyle/>
+          <a:p>
+            <a:pPr marL="0" lvl="0" indent="0" algn="l" rtl="0">
+              <a:spcBef>
+                <a:spcPts val="0"/>
+              </a:spcBef>
+              <a:spcAft>
+                <a:spcPts val="0"/>
+              </a:spcAft>
+              <a:buNone/>
+            </a:pPr>
+            <a:r>
+              <a:rPr lang="en"/>
+              <a:t> </a:t>
+            </a:r>
+            <a:endParaRPr/>
+          </a:p>
+        </p:txBody>
+      </p:sp>
+      <p:sp>
+        <p:nvSpPr>
+          <p:cNvPr id="151" name="Google Shape;151;p21"/>
+          <p:cNvSpPr/>
+          <p:nvPr/>
+        </p:nvSpPr>
+        <p:spPr>
+          <a:xfrm>
+            <a:off x="7212600" y="4880100"/>
+            <a:ext cx="1931400" cy="263400"/>
+          </a:xfrm>
+          <a:prstGeom prst="rect">
+            <a:avLst/>
+          </a:prstGeom>
+          <a:solidFill>
+            <a:srgbClr val="B3B3AB"/>
+          </a:solidFill>
+          <a:ln w="9525" cap="flat" cmpd="sng">
+            <a:solidFill>
+              <a:srgbClr val="B3B3AB"/>
+            </a:solidFill>
+            <a:prstDash val="solid"/>
+            <a:round/>
+            <a:headEnd type="none" w="sm" len="sm"/>
+            <a:tailEnd type="none" w="sm" len="sm"/>
+          </a:ln>
+        </p:spPr>
+        <p:txBody>
+          <a:bodyPr spcFirstLastPara="1" wrap="square" lIns="91425" tIns="91425" rIns="91425" bIns="91425" anchor="ctr" anchorCtr="0">
+            <a:noAutofit/>
+          </a:bodyPr>
+          <a:lstStyle/>
+          <a:p>
+            <a:pPr marL="0" lvl="0" indent="0" algn="l" rtl="0">
+              <a:spcBef>
+                <a:spcPts val="0"/>
+              </a:spcBef>
+              <a:spcAft>
+                <a:spcPts val="0"/>
+              </a:spcAft>
+              <a:buNone/>
+            </a:pPr>
+            <a:r>
+              <a:rPr lang="en"/>
+              <a:t> </a:t>
+            </a:r>
+            <a:endParaRPr/>
+          </a:p>
+        </p:txBody>
+      </p:sp>
+      <p:pic>
+        <p:nvPicPr>
+          <p:cNvPr id="152" name="Google Shape;152;p21"/>
+          <p:cNvPicPr preferRelativeResize="0"/>
+          <p:nvPr/>
+        </p:nvPicPr>
+        <p:blipFill>
+          <a:blip r:embed="rId4">
+            <a:alphaModFix/>
+          </a:blip>
+          <a:stretch>
+            <a:fillRect/>
+          </a:stretch>
+        </p:blipFill>
+        <p:spPr>
+          <a:xfrm>
+            <a:off x="7403174" y="4953925"/>
+            <a:ext cx="1575999" cy="115750"/>
+          </a:xfrm>
+          <a:prstGeom prst="rect">
+            <a:avLst/>
+          </a:prstGeom>
+          <a:noFill/>
+          <a:ln>
+            <a:noFill/>
+          </a:ln>
+        </p:spPr>
+      </p:pic>
+      <p:pic>
+        <p:nvPicPr>
+          <p:cNvPr id="153" name="Google Shape;153;p21"/>
+          <p:cNvPicPr preferRelativeResize="0"/>
+          <p:nvPr/>
+        </p:nvPicPr>
+        <p:blipFill>
+          <a:blip r:embed="rId5">
+            <a:alphaModFix/>
+          </a:blip>
+          <a:stretch>
+            <a:fillRect/>
+          </a:stretch>
+        </p:blipFill>
+        <p:spPr>
+          <a:xfrm>
+            <a:off x="87850" y="4931817"/>
+            <a:ext cx="1073603" cy="159974"/>
+          </a:xfrm>
+          <a:prstGeom prst="rect">
+            <a:avLst/>
+          </a:prstGeom>
+          <a:noFill/>
+          <a:ln>
+            <a:noFill/>
+          </a:ln>
+        </p:spPr>
+      </p:pic>
+    </p:spTree>
+  </p:cSld>
+  <p:clrMapOvr>
+    <a:masterClrMapping/>
+  </p:clrMapOvr>
+</p:sld>
+</file>
+
+<file path=ppt/slides/slide11.xml><?xml version="1.0" encoding="utf-8"?>
 <p:sld xmlns:a="http://schemas.openxmlformats.org/drawingml/2006/main" xmlns:r="http://schemas.openxmlformats.org/officeDocument/2006/relationships" xmlns:p="http://schemas.openxmlformats.org/presentationml/2006/main">
   <p:cSld>
     <p:spTree>
@@ -7996,6 +8315,373 @@
   <p:cSld>
     <p:spTree>
       <p:nvGrpSpPr>
+        <p:cNvPr id="1" name="Shape 91"/>
+        <p:cNvGrpSpPr/>
+        <p:nvPr/>
+      </p:nvGrpSpPr>
+      <p:grpSpPr>
+        <a:xfrm>
+          <a:off x="0" y="0"/>
+          <a:ext cx="0" cy="0"/>
+          <a:chOff x="0" y="0"/>
+          <a:chExt cx="0" cy="0"/>
+        </a:xfrm>
+      </p:grpSpPr>
+      <p:sp>
+        <p:nvSpPr>
+          <p:cNvPr id="92" name="Google Shape;92;p16"/>
+          <p:cNvSpPr/>
+          <p:nvPr/>
+        </p:nvSpPr>
+        <p:spPr>
+          <a:xfrm>
+            <a:off x="0" y="0"/>
+            <a:ext cx="9144000" cy="5143500"/>
+          </a:xfrm>
+          <a:prstGeom prst="rect">
+            <a:avLst/>
+          </a:prstGeom>
+          <a:solidFill>
+            <a:schemeClr val="lt2"/>
+          </a:solidFill>
+          <a:ln>
+            <a:noFill/>
+          </a:ln>
+        </p:spPr>
+        <p:txBody>
+          <a:bodyPr spcFirstLastPara="1" wrap="square" lIns="91425" tIns="91425" rIns="91425" bIns="91425" anchor="ctr" anchorCtr="0">
+            <a:noAutofit/>
+          </a:bodyPr>
+          <a:lstStyle/>
+          <a:p>
+            <a:pPr marL="0" lvl="0" indent="0" algn="l" rtl="0">
+              <a:spcBef>
+                <a:spcPts val="0"/>
+              </a:spcBef>
+              <a:spcAft>
+                <a:spcPts val="0"/>
+              </a:spcAft>
+              <a:buNone/>
+            </a:pPr>
+            <a:endParaRPr lang="en-ZA"/>
+          </a:p>
+        </p:txBody>
+      </p:sp>
+      <p:sp>
+        <p:nvSpPr>
+          <p:cNvPr id="93" name="Google Shape;93;p16"/>
+          <p:cNvSpPr/>
+          <p:nvPr/>
+        </p:nvSpPr>
+        <p:spPr>
+          <a:xfrm>
+            <a:off x="0" y="4880100"/>
+            <a:ext cx="9144000" cy="263400"/>
+          </a:xfrm>
+          <a:prstGeom prst="rect">
+            <a:avLst/>
+          </a:prstGeom>
+          <a:solidFill>
+            <a:srgbClr val="649E8F"/>
+          </a:solidFill>
+          <a:ln w="9525" cap="flat" cmpd="sng">
+            <a:solidFill>
+              <a:srgbClr val="649E8F"/>
+            </a:solidFill>
+            <a:prstDash val="solid"/>
+            <a:round/>
+            <a:headEnd type="none" w="sm" len="sm"/>
+            <a:tailEnd type="none" w="sm" len="sm"/>
+          </a:ln>
+        </p:spPr>
+        <p:txBody>
+          <a:bodyPr spcFirstLastPara="1" wrap="square" lIns="91425" tIns="91425" rIns="91425" bIns="91425" anchor="ctr" anchorCtr="0">
+            <a:noAutofit/>
+          </a:bodyPr>
+          <a:lstStyle/>
+          <a:p>
+            <a:pPr marL="0" lvl="0" indent="0" algn="l" rtl="0">
+              <a:spcBef>
+                <a:spcPts val="0"/>
+              </a:spcBef>
+              <a:spcAft>
+                <a:spcPts val="0"/>
+              </a:spcAft>
+              <a:buNone/>
+            </a:pPr>
+            <a:r>
+              <a:rPr lang="en"/>
+              <a:t> </a:t>
+            </a:r>
+            <a:endParaRPr/>
+          </a:p>
+        </p:txBody>
+      </p:sp>
+      <p:sp>
+        <p:nvSpPr>
+          <p:cNvPr id="94" name="Google Shape;94;p16"/>
+          <p:cNvSpPr/>
+          <p:nvPr/>
+        </p:nvSpPr>
+        <p:spPr>
+          <a:xfrm>
+            <a:off x="7212600" y="4880100"/>
+            <a:ext cx="1931400" cy="263400"/>
+          </a:xfrm>
+          <a:prstGeom prst="rect">
+            <a:avLst/>
+          </a:prstGeom>
+          <a:solidFill>
+            <a:srgbClr val="B3B3AB"/>
+          </a:solidFill>
+          <a:ln w="9525" cap="flat" cmpd="sng">
+            <a:solidFill>
+              <a:srgbClr val="B3B3AB"/>
+            </a:solidFill>
+            <a:prstDash val="solid"/>
+            <a:round/>
+            <a:headEnd type="none" w="sm" len="sm"/>
+            <a:tailEnd type="none" w="sm" len="sm"/>
+          </a:ln>
+        </p:spPr>
+        <p:txBody>
+          <a:bodyPr spcFirstLastPara="1" wrap="square" lIns="91425" tIns="91425" rIns="91425" bIns="91425" anchor="ctr" anchorCtr="0">
+            <a:noAutofit/>
+          </a:bodyPr>
+          <a:lstStyle/>
+          <a:p>
+            <a:pPr marL="0" lvl="0" indent="0" algn="l" rtl="0">
+              <a:spcBef>
+                <a:spcPts val="0"/>
+              </a:spcBef>
+              <a:spcAft>
+                <a:spcPts val="0"/>
+              </a:spcAft>
+              <a:buNone/>
+            </a:pPr>
+            <a:r>
+              <a:rPr lang="en"/>
+              <a:t> </a:t>
+            </a:r>
+            <a:endParaRPr/>
+          </a:p>
+        </p:txBody>
+      </p:sp>
+      <p:pic>
+        <p:nvPicPr>
+          <p:cNvPr id="95" name="Google Shape;95;p16"/>
+          <p:cNvPicPr preferRelativeResize="0"/>
+          <p:nvPr/>
+        </p:nvPicPr>
+        <p:blipFill>
+          <a:blip r:embed="rId3">
+            <a:alphaModFix/>
+          </a:blip>
+          <a:stretch>
+            <a:fillRect/>
+          </a:stretch>
+        </p:blipFill>
+        <p:spPr>
+          <a:xfrm>
+            <a:off x="7403174" y="4953925"/>
+            <a:ext cx="1575999" cy="115750"/>
+          </a:xfrm>
+          <a:prstGeom prst="rect">
+            <a:avLst/>
+          </a:prstGeom>
+          <a:noFill/>
+          <a:ln>
+            <a:noFill/>
+          </a:ln>
+        </p:spPr>
+      </p:pic>
+      <p:pic>
+        <p:nvPicPr>
+          <p:cNvPr id="96" name="Google Shape;96;p16"/>
+          <p:cNvPicPr preferRelativeResize="0"/>
+          <p:nvPr/>
+        </p:nvPicPr>
+        <p:blipFill>
+          <a:blip r:embed="rId4">
+            <a:alphaModFix/>
+          </a:blip>
+          <a:stretch>
+            <a:fillRect/>
+          </a:stretch>
+        </p:blipFill>
+        <p:spPr>
+          <a:xfrm>
+            <a:off x="87850" y="4931817"/>
+            <a:ext cx="1073603" cy="159974"/>
+          </a:xfrm>
+          <a:prstGeom prst="rect">
+            <a:avLst/>
+          </a:prstGeom>
+          <a:noFill/>
+          <a:ln>
+            <a:noFill/>
+          </a:ln>
+        </p:spPr>
+      </p:pic>
+      <p:sp>
+        <p:nvSpPr>
+          <p:cNvPr id="15" name="TextBox 14">
+            <a:extLst>
+              <a:ext uri="{FF2B5EF4-FFF2-40B4-BE49-F238E27FC236}">
+                <a16:creationId xmlns:a16="http://schemas.microsoft.com/office/drawing/2014/main" id="{91CB0C2C-278E-47D2-86DC-A230C9695316}"/>
+              </a:ext>
+            </a:extLst>
+          </p:cNvPr>
+          <p:cNvSpPr txBox="1"/>
+          <p:nvPr/>
+        </p:nvSpPr>
+        <p:spPr>
+          <a:xfrm>
+            <a:off x="279400" y="562613"/>
+            <a:ext cx="4577644" cy="3754874"/>
+          </a:xfrm>
+          <a:prstGeom prst="rect">
+            <a:avLst/>
+          </a:prstGeom>
+          <a:noFill/>
+        </p:spPr>
+        <p:txBody>
+          <a:bodyPr wrap="square">
+            <a:spAutoFit/>
+          </a:bodyPr>
+          <a:lstStyle/>
+          <a:p>
+            <a:endParaRPr lang="en-ZA" dirty="0"/>
+          </a:p>
+          <a:p>
+            <a:r>
+              <a:rPr lang="en-ZA" dirty="0"/>
+              <a:t>Conditional Operators: </a:t>
+            </a:r>
+          </a:p>
+          <a:p>
+            <a:endParaRPr lang="en-ZA" dirty="0"/>
+          </a:p>
+          <a:p>
+            <a:r>
+              <a:rPr lang="en-ZA" dirty="0"/>
+              <a:t>- is equal to == </a:t>
+            </a:r>
+          </a:p>
+          <a:p>
+            <a:r>
+              <a:rPr lang="en-ZA" dirty="0"/>
+              <a:t>- is not equal to != </a:t>
+            </a:r>
+          </a:p>
+          <a:p>
+            <a:r>
+              <a:rPr lang="en-ZA" dirty="0"/>
+              <a:t>- is (strict) equal to === ( checks data type and value )</a:t>
+            </a:r>
+          </a:p>
+          <a:p>
+            <a:r>
+              <a:rPr lang="en-ZA" dirty="0"/>
+              <a:t>- is (strict) not equal to !== </a:t>
+            </a:r>
+          </a:p>
+          <a:p>
+            <a:r>
+              <a:rPr lang="en-ZA" dirty="0"/>
+              <a:t>- is greater than &gt; </a:t>
+            </a:r>
+          </a:p>
+          <a:p>
+            <a:r>
+              <a:rPr lang="en-ZA" dirty="0"/>
+              <a:t>- is less than sign &lt; </a:t>
+            </a:r>
+          </a:p>
+          <a:p>
+            <a:endParaRPr lang="en-ZA" dirty="0"/>
+          </a:p>
+          <a:p>
+            <a:r>
+              <a:rPr lang="en-ZA" dirty="0"/>
+              <a:t>Logical Operators: </a:t>
+            </a:r>
+          </a:p>
+          <a:p>
+            <a:endParaRPr lang="en-ZA" dirty="0"/>
+          </a:p>
+          <a:p>
+            <a:r>
+              <a:rPr lang="en-ZA" dirty="0"/>
+              <a:t>- Logical AND : &amp;&amp; </a:t>
+            </a:r>
+          </a:p>
+          <a:p>
+            <a:r>
+              <a:rPr lang="en-ZA" dirty="0"/>
+              <a:t>- Logical OR : || </a:t>
+            </a:r>
+          </a:p>
+          <a:p>
+            <a:r>
+              <a:rPr lang="en-ZA" dirty="0"/>
+              <a:t>- Logical NOT : !</a:t>
+            </a:r>
+          </a:p>
+          <a:p>
+            <a:endParaRPr lang="en-ZA" dirty="0"/>
+          </a:p>
+          <a:p>
+            <a:r>
+              <a:rPr lang="en-ZA" dirty="0"/>
+              <a:t>Switch Statements</a:t>
+            </a:r>
+          </a:p>
+        </p:txBody>
+      </p:sp>
+      <p:pic>
+        <p:nvPicPr>
+          <p:cNvPr id="6" name="Picture 5">
+            <a:extLst>
+              <a:ext uri="{FF2B5EF4-FFF2-40B4-BE49-F238E27FC236}">
+                <a16:creationId xmlns:a16="http://schemas.microsoft.com/office/drawing/2014/main" id="{124F1577-8080-45F1-B6BB-C465B677A1B9}"/>
+              </a:ext>
+            </a:extLst>
+          </p:cNvPr>
+          <p:cNvPicPr>
+            <a:picLocks noChangeAspect="1"/>
+          </p:cNvPicPr>
+          <p:nvPr/>
+        </p:nvPicPr>
+        <p:blipFill>
+          <a:blip r:embed="rId5"/>
+          <a:stretch>
+            <a:fillRect/>
+          </a:stretch>
+        </p:blipFill>
+        <p:spPr>
+          <a:xfrm>
+            <a:off x="4857044" y="267436"/>
+            <a:ext cx="4007556" cy="4496430"/>
+          </a:xfrm>
+          <a:prstGeom prst="rect">
+            <a:avLst/>
+          </a:prstGeom>
+        </p:spPr>
+      </p:pic>
+    </p:spTree>
+  </p:cSld>
+  <p:clrMapOvr>
+    <a:masterClrMapping/>
+  </p:clrMapOvr>
+</p:sld>
+</file>
+
+<file path=ppt/slides/slide4.xml><?xml version="1.0" encoding="utf-8"?>
+<p:sld xmlns:a="http://schemas.openxmlformats.org/drawingml/2006/main" xmlns:r="http://schemas.openxmlformats.org/officeDocument/2006/relationships" xmlns:p="http://schemas.openxmlformats.org/presentationml/2006/main">
+  <p:cSld>
+    <p:spTree>
+      <p:nvGrpSpPr>
         <p:cNvPr id="1" name="Shape 79"/>
         <p:cNvGrpSpPr/>
         <p:nvPr/>
@@ -8343,7 +9029,7 @@
                 <a:cs typeface="Gill Sans"/>
                 <a:sym typeface="Gill Sans"/>
               </a:rPr>
-              <a:t>Types of conditionals</a:t>
+              <a:t>Loops</a:t>
             </a:r>
           </a:p>
           <a:p>
@@ -8371,7 +9057,7 @@
                 <a:cs typeface="Gill Sans"/>
                 <a:sym typeface="Gill Sans"/>
               </a:rPr>
-              <a:t>Logical operators</a:t>
+              <a:t>Functions</a:t>
             </a:r>
           </a:p>
         </p:txBody>
@@ -8412,12 +9098,12 @@
 </p:sld>
 </file>
 
-<file path=ppt/slides/slide4.xml><?xml version="1.0" encoding="utf-8"?>
+<file path=ppt/slides/slide5.xml><?xml version="1.0" encoding="utf-8"?>
 <p:sld xmlns:a="http://schemas.openxmlformats.org/drawingml/2006/main" xmlns:r="http://schemas.openxmlformats.org/officeDocument/2006/relationships" xmlns:p="http://schemas.openxmlformats.org/presentationml/2006/main">
   <p:cSld>
     <p:spTree>
       <p:nvGrpSpPr>
-        <p:cNvPr id="1" name="Shape 91"/>
+        <p:cNvPr id="1" name="Shape 116"/>
         <p:cNvGrpSpPr/>
         <p:nvPr/>
       </p:nvGrpSpPr>
@@ -8431,7 +9117,7 @@
       </p:grpSpPr>
       <p:sp>
         <p:nvSpPr>
-          <p:cNvPr id="92" name="Google Shape;92;p16"/>
+          <p:cNvPr id="117" name="Google Shape;117;p18"/>
           <p:cNvSpPr/>
           <p:nvPr/>
         </p:nvSpPr>
@@ -8444,7 +9130,7 @@
             <a:avLst/>
           </a:prstGeom>
           <a:solidFill>
-            <a:schemeClr val="lt2"/>
+            <a:srgbClr val="656665"/>
           </a:solidFill>
           <a:ln>
             <a:noFill/>
@@ -8465,13 +9151,66 @@
               </a:spcAft>
               <a:buNone/>
             </a:pPr>
-            <a:endParaRPr lang="en-ZA"/>
+            <a:endParaRPr>
+              <a:solidFill>
+                <a:srgbClr val="656665"/>
+              </a:solidFill>
+            </a:endParaRPr>
           </a:p>
         </p:txBody>
       </p:sp>
       <p:sp>
         <p:nvSpPr>
-          <p:cNvPr id="93" name="Google Shape;93;p16"/>
+          <p:cNvPr id="118" name="Google Shape;118;p18"/>
+          <p:cNvSpPr txBox="1"/>
+          <p:nvPr/>
+        </p:nvSpPr>
+        <p:spPr>
+          <a:xfrm>
+            <a:off x="5579600" y="908575"/>
+            <a:ext cx="2598900" cy="774000"/>
+          </a:xfrm>
+          <a:prstGeom prst="rect">
+            <a:avLst/>
+          </a:prstGeom>
+          <a:noFill/>
+          <a:ln>
+            <a:noFill/>
+          </a:ln>
+        </p:spPr>
+        <p:txBody>
+          <a:bodyPr spcFirstLastPara="1" wrap="square" lIns="91425" tIns="91425" rIns="91425" bIns="91425" anchor="t" anchorCtr="0">
+            <a:noAutofit/>
+          </a:bodyPr>
+          <a:lstStyle/>
+          <a:p>
+            <a:pPr marL="0" lvl="0" indent="0" algn="l" rtl="0">
+              <a:spcBef>
+                <a:spcPts val="0"/>
+              </a:spcBef>
+              <a:spcAft>
+                <a:spcPts val="0"/>
+              </a:spcAft>
+              <a:buNone/>
+            </a:pPr>
+            <a:r>
+              <a:rPr lang="en-US" sz="2500" dirty="0">
+                <a:solidFill>
+                  <a:srgbClr val="649E8F"/>
+                </a:solidFill>
+                <a:latin typeface="Gill Sans"/>
+                <a:ea typeface="Gill Sans"/>
+                <a:cs typeface="Gill Sans"/>
+                <a:sym typeface="Gill Sans"/>
+              </a:rPr>
+              <a:t>Objects &amp; Arrays </a:t>
+            </a:r>
+          </a:p>
+        </p:txBody>
+      </p:sp>
+      <p:sp>
+        <p:nvSpPr>
+          <p:cNvPr id="119" name="Google Shape;119;p18"/>
           <p:cNvSpPr/>
           <p:nvPr/>
         </p:nvSpPr>
@@ -8521,7 +9260,7 @@
       </p:sp>
       <p:sp>
         <p:nvSpPr>
-          <p:cNvPr id="94" name="Google Shape;94;p16"/>
+          <p:cNvPr id="120" name="Google Shape;120;p18"/>
           <p:cNvSpPr/>
           <p:nvPr/>
         </p:nvSpPr>
@@ -8571,7 +9310,7 @@
       </p:sp>
       <p:pic>
         <p:nvPicPr>
-          <p:cNvPr id="95" name="Google Shape;95;p16"/>
+          <p:cNvPr id="121" name="Google Shape;121;p18"/>
           <p:cNvPicPr preferRelativeResize="0"/>
           <p:nvPr/>
         </p:nvPicPr>
@@ -8599,7 +9338,7 @@
       </p:pic>
       <p:pic>
         <p:nvPicPr>
-          <p:cNvPr id="96" name="Google Shape;96;p16"/>
+          <p:cNvPr id="122" name="Google Shape;122;p18"/>
           <p:cNvPicPr preferRelativeResize="0"/>
           <p:nvPr/>
         </p:nvPicPr>
@@ -8627,148 +9366,196 @@
       </p:pic>
       <p:sp>
         <p:nvSpPr>
-          <p:cNvPr id="15" name="TextBox 14">
-            <a:extLst>
-              <a:ext uri="{FF2B5EF4-FFF2-40B4-BE49-F238E27FC236}">
-                <a16:creationId xmlns:a16="http://schemas.microsoft.com/office/drawing/2014/main" id="{91CB0C2C-278E-47D2-86DC-A230C9695316}"/>
-              </a:ext>
-            </a:extLst>
-          </p:cNvPr>
+          <p:cNvPr id="123" name="Google Shape;123;p18"/>
           <p:cNvSpPr txBox="1"/>
           <p:nvPr/>
         </p:nvSpPr>
         <p:spPr>
           <a:xfrm>
-            <a:off x="279400" y="562613"/>
-            <a:ext cx="4577644" cy="3754874"/>
+            <a:off x="5283906" y="1756400"/>
+            <a:ext cx="4523100" cy="1863300"/>
           </a:xfrm>
           <a:prstGeom prst="rect">
             <a:avLst/>
           </a:prstGeom>
           <a:noFill/>
+          <a:ln>
+            <a:noFill/>
+          </a:ln>
         </p:spPr>
         <p:txBody>
-          <a:bodyPr wrap="square">
-            <a:spAutoFit/>
+          <a:bodyPr spcFirstLastPara="1" wrap="square" lIns="91425" tIns="91425" rIns="91425" bIns="91425" anchor="t" anchorCtr="0">
+            <a:noAutofit/>
           </a:bodyPr>
           <a:lstStyle/>
           <a:p>
-            <a:endParaRPr lang="en-ZA" dirty="0"/>
-          </a:p>
-          <a:p>
+            <a:pPr marL="457200" lvl="0" indent="-355600" algn="l" rtl="0">
+              <a:spcBef>
+                <a:spcPts val="0"/>
+              </a:spcBef>
+              <a:spcAft>
+                <a:spcPts val="0"/>
+              </a:spcAft>
+              <a:buClr>
+                <a:srgbClr val="FFFFFF"/>
+              </a:buClr>
+              <a:buSzPts val="2000"/>
+              <a:buFont typeface="Gill Sans"/>
+              <a:buChar char="●"/>
+            </a:pPr>
             <a:r>
-              <a:rPr lang="en-ZA" dirty="0"/>
-              <a:t>Conditional Operators: </a:t>
+              <a:rPr lang="en-US" sz="2000" dirty="0">
+                <a:solidFill>
+                  <a:srgbClr val="FFFFFF"/>
+                </a:solidFill>
+                <a:latin typeface="Gill Sans"/>
+                <a:ea typeface="Gill Sans"/>
+                <a:cs typeface="Gill Sans"/>
+                <a:sym typeface="Gill Sans"/>
+              </a:rPr>
+              <a:t>Arrays Intro</a:t>
             </a:r>
           </a:p>
           <a:p>
-            <a:endParaRPr lang="en-ZA" dirty="0"/>
-          </a:p>
-          <a:p>
+            <a:pPr marL="457200" lvl="0" indent="-355600" algn="l" rtl="0">
+              <a:spcBef>
+                <a:spcPts val="0"/>
+              </a:spcBef>
+              <a:spcAft>
+                <a:spcPts val="0"/>
+              </a:spcAft>
+              <a:buClr>
+                <a:srgbClr val="FFFFFF"/>
+              </a:buClr>
+              <a:buSzPts val="2000"/>
+              <a:buFont typeface="Gill Sans"/>
+              <a:buChar char="●"/>
+            </a:pPr>
             <a:r>
-              <a:rPr lang="en-ZA" dirty="0"/>
-              <a:t>- is equal to == </a:t>
+              <a:rPr lang="en-US" sz="2000" dirty="0">
+                <a:solidFill>
+                  <a:srgbClr val="FFFFFF"/>
+                </a:solidFill>
+                <a:latin typeface="Gill Sans"/>
+                <a:ea typeface="Gill Sans"/>
+                <a:cs typeface="Gill Sans"/>
+                <a:sym typeface="Gill Sans"/>
+              </a:rPr>
+              <a:t>Data Types</a:t>
             </a:r>
           </a:p>
           <a:p>
+            <a:pPr marL="457200" lvl="0" indent="-355600" algn="l" rtl="0">
+              <a:spcBef>
+                <a:spcPts val="0"/>
+              </a:spcBef>
+              <a:spcAft>
+                <a:spcPts val="0"/>
+              </a:spcAft>
+              <a:buClr>
+                <a:srgbClr val="FFFFFF"/>
+              </a:buClr>
+              <a:buSzPts val="2000"/>
+              <a:buFont typeface="Gill Sans"/>
+              <a:buChar char="●"/>
+            </a:pPr>
             <a:r>
-              <a:rPr lang="en-ZA" dirty="0"/>
-              <a:t>- is not equal to != </a:t>
+              <a:rPr lang="en-US" sz="2000" dirty="0">
+                <a:solidFill>
+                  <a:srgbClr val="FFFFFF"/>
+                </a:solidFill>
+                <a:latin typeface="Gill Sans"/>
+                <a:ea typeface="Gill Sans"/>
+                <a:cs typeface="Gill Sans"/>
+                <a:sym typeface="Gill Sans"/>
+              </a:rPr>
+              <a:t>Objects Intro</a:t>
             </a:r>
           </a:p>
           <a:p>
+            <a:pPr marL="457200" lvl="0" indent="-355600" algn="l" rtl="0">
+              <a:spcBef>
+                <a:spcPts val="0"/>
+              </a:spcBef>
+              <a:spcAft>
+                <a:spcPts val="0"/>
+              </a:spcAft>
+              <a:buClr>
+                <a:srgbClr val="FFFFFF"/>
+              </a:buClr>
+              <a:buSzPts val="2000"/>
+              <a:buFont typeface="Gill Sans"/>
+              <a:buChar char="●"/>
+            </a:pPr>
             <a:r>
-              <a:rPr lang="en-ZA" dirty="0"/>
-              <a:t>- is (strict) equal to === ( checks data type and value )</a:t>
+              <a:rPr lang="en-US" sz="2000" dirty="0">
+                <a:solidFill>
+                  <a:srgbClr val="FFFFFF"/>
+                </a:solidFill>
+                <a:latin typeface="Gill Sans"/>
+                <a:ea typeface="Gill Sans"/>
+                <a:cs typeface="Gill Sans"/>
+                <a:sym typeface="Gill Sans"/>
+              </a:rPr>
+              <a:t>Array Methods &amp; Properties</a:t>
             </a:r>
           </a:p>
           <a:p>
+            <a:pPr marL="457200" lvl="0" indent="-355600" algn="l" rtl="0">
+              <a:spcBef>
+                <a:spcPts val="0"/>
+              </a:spcBef>
+              <a:spcAft>
+                <a:spcPts val="0"/>
+              </a:spcAft>
+              <a:buClr>
+                <a:srgbClr val="FFFFFF"/>
+              </a:buClr>
+              <a:buSzPts val="2000"/>
+              <a:buFont typeface="Gill Sans"/>
+              <a:buChar char="●"/>
+            </a:pPr>
             <a:r>
-              <a:rPr lang="en-ZA" dirty="0"/>
-              <a:t>- is (strict) not equal to !== </a:t>
-            </a:r>
-          </a:p>
-          <a:p>
-            <a:r>
-              <a:rPr lang="en-ZA" dirty="0"/>
-              <a:t>- is greater than &gt; </a:t>
-            </a:r>
-          </a:p>
-          <a:p>
-            <a:r>
-              <a:rPr lang="en-ZA" dirty="0"/>
-              <a:t>- is less than sign &lt; </a:t>
-            </a:r>
-          </a:p>
-          <a:p>
-            <a:endParaRPr lang="en-ZA" dirty="0"/>
-          </a:p>
-          <a:p>
-            <a:r>
-              <a:rPr lang="en-ZA" dirty="0"/>
-              <a:t>Logical Operators: </a:t>
-            </a:r>
-          </a:p>
-          <a:p>
-            <a:endParaRPr lang="en-ZA" dirty="0"/>
-          </a:p>
-          <a:p>
-            <a:r>
-              <a:rPr lang="en-ZA" dirty="0"/>
-              <a:t>- Logical AND : &amp;&amp; </a:t>
-            </a:r>
-          </a:p>
-          <a:p>
-            <a:r>
-              <a:rPr lang="en-ZA" dirty="0"/>
-              <a:t>- Logical OR : || </a:t>
-            </a:r>
-          </a:p>
-          <a:p>
-            <a:r>
-              <a:rPr lang="en-ZA" dirty="0"/>
-              <a:t>- Logical NOT : !</a:t>
-            </a:r>
-          </a:p>
-          <a:p>
-            <a:endParaRPr lang="en-ZA" dirty="0"/>
-          </a:p>
-          <a:p>
-            <a:r>
-              <a:rPr lang="en-ZA" dirty="0"/>
-              <a:t>Switch Statements</a:t>
+              <a:rPr lang="en-US" sz="2000" dirty="0">
+                <a:solidFill>
+                  <a:srgbClr val="FFFFFF"/>
+                </a:solidFill>
+                <a:latin typeface="Gill Sans"/>
+                <a:ea typeface="Gill Sans"/>
+                <a:cs typeface="Gill Sans"/>
+                <a:sym typeface="Gill Sans"/>
+              </a:rPr>
+              <a:t>Arrays in Dept</a:t>
             </a:r>
           </a:p>
         </p:txBody>
       </p:sp>
       <p:pic>
         <p:nvPicPr>
-          <p:cNvPr id="6" name="Picture 5">
-            <a:extLst>
-              <a:ext uri="{FF2B5EF4-FFF2-40B4-BE49-F238E27FC236}">
-                <a16:creationId xmlns:a16="http://schemas.microsoft.com/office/drawing/2014/main" id="{124F1577-8080-45F1-B6BB-C465B677A1B9}"/>
-              </a:ext>
-            </a:extLst>
-          </p:cNvPr>
-          <p:cNvPicPr>
-            <a:picLocks noChangeAspect="1"/>
-          </p:cNvPicPr>
+          <p:cNvPr id="124" name="Google Shape;124;p18"/>
+          <p:cNvPicPr preferRelativeResize="0"/>
           <p:nvPr/>
         </p:nvPicPr>
         <p:blipFill>
-          <a:blip r:embed="rId5"/>
+          <a:blip r:embed="rId5">
+            <a:alphaModFix/>
+          </a:blip>
           <a:stretch>
             <a:fillRect/>
           </a:stretch>
         </p:blipFill>
         <p:spPr>
           <a:xfrm>
-            <a:off x="4857044" y="267436"/>
-            <a:ext cx="4007556" cy="4496430"/>
-          </a:xfrm>
-          <a:prstGeom prst="rect">
-            <a:avLst/>
-          </a:prstGeom>
+            <a:off x="0" y="0"/>
+            <a:ext cx="4880101" cy="4880101"/>
+          </a:xfrm>
+          <a:prstGeom prst="rect">
+            <a:avLst/>
+          </a:prstGeom>
+          <a:noFill/>
+          <a:ln>
+            <a:noFill/>
+          </a:ln>
         </p:spPr>
       </p:pic>
     </p:spTree>
@@ -8779,7 +9566,7 @@
 </p:sld>
 </file>
 
-<file path=ppt/slides/slide5.xml><?xml version="1.0" encoding="utf-8"?>
+<file path=ppt/slides/slide6.xml><?xml version="1.0" encoding="utf-8"?>
 <p:sld xmlns:a="http://schemas.openxmlformats.org/drawingml/2006/main" xmlns:r="http://schemas.openxmlformats.org/officeDocument/2006/relationships" xmlns:p="http://schemas.openxmlformats.org/presentationml/2006/main">
   <p:cSld>
     <p:spTree>
@@ -8988,7 +9775,7 @@
 </p:sld>
 </file>
 
-<file path=ppt/slides/slide6.xml><?xml version="1.0" encoding="utf-8"?>
+<file path=ppt/slides/slide7.xml><?xml version="1.0" encoding="utf-8"?>
 <p:sld xmlns:a="http://schemas.openxmlformats.org/drawingml/2006/main" xmlns:r="http://schemas.openxmlformats.org/officeDocument/2006/relationships" xmlns:p="http://schemas.openxmlformats.org/presentationml/2006/main">
   <p:cSld>
     <p:spTree>
@@ -9058,7 +9845,7 @@
         <p:spPr>
           <a:xfrm>
             <a:off x="5579600" y="908575"/>
-            <a:ext cx="2598900" cy="774000"/>
+            <a:ext cx="3135192" cy="774000"/>
           </a:xfrm>
           <a:prstGeom prst="rect">
             <a:avLst/>
@@ -9093,7 +9880,7 @@
                 <a:cs typeface="Gill Sans"/>
                 <a:sym typeface="Gill Sans"/>
               </a:rPr>
-              <a:t>Objects &amp; Arrays </a:t>
+              <a:t>OOP &amp; Software Maintenance</a:t>
             </a:r>
           </a:p>
         </p:txBody>
@@ -9263,7 +10050,7 @@
         <p:spPr>
           <a:xfrm>
             <a:off x="5283906" y="1756400"/>
-            <a:ext cx="4523100" cy="1863300"/>
+            <a:ext cx="3430886" cy="2656980"/>
           </a:xfrm>
           <a:prstGeom prst="rect">
             <a:avLst/>
@@ -9303,7 +10090,7 @@
                 <a:cs typeface="Gill Sans"/>
                 <a:sym typeface="Gill Sans"/>
               </a:rPr>
-              <a:t>Arrays Intro</a:t>
+              <a:t>Fundamental Object Oriented Programming</a:t>
             </a:r>
           </a:p>
           <a:p>
@@ -9331,7 +10118,7 @@
                 <a:cs typeface="Gill Sans"/>
                 <a:sym typeface="Gill Sans"/>
               </a:rPr>
-              <a:t>Data Types</a:t>
+              <a:t>Variable Scope &amp; Data Encapsulation</a:t>
             </a:r>
           </a:p>
           <a:p>
@@ -9359,7 +10146,7 @@
                 <a:cs typeface="Gill Sans"/>
                 <a:sym typeface="Gill Sans"/>
               </a:rPr>
-              <a:t>Objects Intro</a:t>
+              <a:t>Understanding Classes</a:t>
             </a:r>
           </a:p>
           <a:p>
@@ -9387,7 +10174,7 @@
                 <a:cs typeface="Gill Sans"/>
                 <a:sym typeface="Gill Sans"/>
               </a:rPr>
-              <a:t>Array Methods &amp; Properties</a:t>
+              <a:t>Object Privacy with Object Accessors</a:t>
             </a:r>
           </a:p>
           <a:p>
@@ -9415,7 +10202,7 @@
                 <a:cs typeface="Gill Sans"/>
                 <a:sym typeface="Gill Sans"/>
               </a:rPr>
-              <a:t>Arrays in Dept</a:t>
+              <a:t>Understanding this</a:t>
             </a:r>
           </a:p>
         </p:txBody>
@@ -9449,6 +10236,11 @@
         </p:spPr>
       </p:pic>
     </p:spTree>
+    <p:extLst>
+      <p:ext uri="{BB962C8B-B14F-4D97-AF65-F5344CB8AC3E}">
+        <p14:creationId xmlns:p14="http://schemas.microsoft.com/office/powerpoint/2010/main" val="4198036491"/>
+      </p:ext>
+    </p:extLst>
   </p:cSld>
   <p:clrMapOvr>
     <a:masterClrMapping/>
@@ -9456,7 +10248,7 @@
 </p:sld>
 </file>
 
-<file path=ppt/slides/slide7.xml><?xml version="1.0" encoding="utf-8"?>
+<file path=ppt/slides/slide8.xml><?xml version="1.0" encoding="utf-8"?>
 <p:sld xmlns:a="http://schemas.openxmlformats.org/drawingml/2006/main" xmlns:r="http://schemas.openxmlformats.org/officeDocument/2006/relationships" xmlns:p="http://schemas.openxmlformats.org/presentationml/2006/main">
   <p:cSld>
     <p:spTree>
@@ -9665,7 +10457,7 @@
 </p:sld>
 </file>
 
-<file path=ppt/slides/slide8.xml><?xml version="1.0" encoding="utf-8"?>
+<file path=ppt/slides/slide9.xml><?xml version="1.0" encoding="utf-8"?>
 <p:sld xmlns:a="http://schemas.openxmlformats.org/drawingml/2006/main" xmlns:r="http://schemas.openxmlformats.org/officeDocument/2006/relationships" xmlns:p="http://schemas.openxmlformats.org/presentationml/2006/main">
   <p:cSld>
     <p:spTree>
@@ -10000,215 +10792,6 @@
           <a:xfrm>
             <a:off x="4263900" y="0"/>
             <a:ext cx="4880101" cy="4880101"/>
-          </a:xfrm>
-          <a:prstGeom prst="rect">
-            <a:avLst/>
-          </a:prstGeom>
-          <a:noFill/>
-          <a:ln>
-            <a:noFill/>
-          </a:ln>
-        </p:spPr>
-      </p:pic>
-    </p:spTree>
-  </p:cSld>
-  <p:clrMapOvr>
-    <a:masterClrMapping/>
-  </p:clrMapOvr>
-</p:sld>
-</file>
-
-<file path=ppt/slides/slide9.xml><?xml version="1.0" encoding="utf-8"?>
-<p:sld xmlns:a="http://schemas.openxmlformats.org/drawingml/2006/main" xmlns:r="http://schemas.openxmlformats.org/officeDocument/2006/relationships" xmlns:p="http://schemas.openxmlformats.org/presentationml/2006/main">
-  <p:cSld>
-    <p:spTree>
-      <p:nvGrpSpPr>
-        <p:cNvPr id="1" name="Shape 148"/>
-        <p:cNvGrpSpPr/>
-        <p:nvPr/>
-      </p:nvGrpSpPr>
-      <p:grpSpPr>
-        <a:xfrm>
-          <a:off x="0" y="0"/>
-          <a:ext cx="0" cy="0"/>
-          <a:chOff x="0" y="0"/>
-          <a:chExt cx="0" cy="0"/>
-        </a:xfrm>
-      </p:grpSpPr>
-      <p:pic>
-        <p:nvPicPr>
-          <p:cNvPr id="149" name="Google Shape;149;p21"/>
-          <p:cNvPicPr preferRelativeResize="0"/>
-          <p:nvPr/>
-        </p:nvPicPr>
-        <p:blipFill>
-          <a:blip r:embed="rId3">
-            <a:alphaModFix/>
-          </a:blip>
-          <a:stretch>
-            <a:fillRect/>
-          </a:stretch>
-        </p:blipFill>
-        <p:spPr>
-          <a:xfrm>
-            <a:off x="0" y="0"/>
-            <a:ext cx="9144000" cy="5143500"/>
-          </a:xfrm>
-          <a:prstGeom prst="rect">
-            <a:avLst/>
-          </a:prstGeom>
-          <a:noFill/>
-          <a:ln>
-            <a:noFill/>
-          </a:ln>
-        </p:spPr>
-      </p:pic>
-      <p:sp>
-        <p:nvSpPr>
-          <p:cNvPr id="150" name="Google Shape;150;p21"/>
-          <p:cNvSpPr/>
-          <p:nvPr/>
-        </p:nvSpPr>
-        <p:spPr>
-          <a:xfrm>
-            <a:off x="0" y="4880100"/>
-            <a:ext cx="9144000" cy="263400"/>
-          </a:xfrm>
-          <a:prstGeom prst="rect">
-            <a:avLst/>
-          </a:prstGeom>
-          <a:solidFill>
-            <a:srgbClr val="649E8F"/>
-          </a:solidFill>
-          <a:ln w="9525" cap="flat" cmpd="sng">
-            <a:solidFill>
-              <a:srgbClr val="649E8F"/>
-            </a:solidFill>
-            <a:prstDash val="solid"/>
-            <a:round/>
-            <a:headEnd type="none" w="sm" len="sm"/>
-            <a:tailEnd type="none" w="sm" len="sm"/>
-          </a:ln>
-        </p:spPr>
-        <p:txBody>
-          <a:bodyPr spcFirstLastPara="1" wrap="square" lIns="91425" tIns="91425" rIns="91425" bIns="91425" anchor="ctr" anchorCtr="0">
-            <a:noAutofit/>
-          </a:bodyPr>
-          <a:lstStyle/>
-          <a:p>
-            <a:pPr marL="0" lvl="0" indent="0" algn="l" rtl="0">
-              <a:spcBef>
-                <a:spcPts val="0"/>
-              </a:spcBef>
-              <a:spcAft>
-                <a:spcPts val="0"/>
-              </a:spcAft>
-              <a:buNone/>
-            </a:pPr>
-            <a:r>
-              <a:rPr lang="en"/>
-              <a:t> </a:t>
-            </a:r>
-            <a:endParaRPr/>
-          </a:p>
-        </p:txBody>
-      </p:sp>
-      <p:sp>
-        <p:nvSpPr>
-          <p:cNvPr id="151" name="Google Shape;151;p21"/>
-          <p:cNvSpPr/>
-          <p:nvPr/>
-        </p:nvSpPr>
-        <p:spPr>
-          <a:xfrm>
-            <a:off x="7212600" y="4880100"/>
-            <a:ext cx="1931400" cy="263400"/>
-          </a:xfrm>
-          <a:prstGeom prst="rect">
-            <a:avLst/>
-          </a:prstGeom>
-          <a:solidFill>
-            <a:srgbClr val="B3B3AB"/>
-          </a:solidFill>
-          <a:ln w="9525" cap="flat" cmpd="sng">
-            <a:solidFill>
-              <a:srgbClr val="B3B3AB"/>
-            </a:solidFill>
-            <a:prstDash val="solid"/>
-            <a:round/>
-            <a:headEnd type="none" w="sm" len="sm"/>
-            <a:tailEnd type="none" w="sm" len="sm"/>
-          </a:ln>
-        </p:spPr>
-        <p:txBody>
-          <a:bodyPr spcFirstLastPara="1" wrap="square" lIns="91425" tIns="91425" rIns="91425" bIns="91425" anchor="ctr" anchorCtr="0">
-            <a:noAutofit/>
-          </a:bodyPr>
-          <a:lstStyle/>
-          <a:p>
-            <a:pPr marL="0" lvl="0" indent="0" algn="l" rtl="0">
-              <a:spcBef>
-                <a:spcPts val="0"/>
-              </a:spcBef>
-              <a:spcAft>
-                <a:spcPts val="0"/>
-              </a:spcAft>
-              <a:buNone/>
-            </a:pPr>
-            <a:r>
-              <a:rPr lang="en"/>
-              <a:t> </a:t>
-            </a:r>
-            <a:endParaRPr/>
-          </a:p>
-        </p:txBody>
-      </p:sp>
-      <p:pic>
-        <p:nvPicPr>
-          <p:cNvPr id="152" name="Google Shape;152;p21"/>
-          <p:cNvPicPr preferRelativeResize="0"/>
-          <p:nvPr/>
-        </p:nvPicPr>
-        <p:blipFill>
-          <a:blip r:embed="rId4">
-            <a:alphaModFix/>
-          </a:blip>
-          <a:stretch>
-            <a:fillRect/>
-          </a:stretch>
-        </p:blipFill>
-        <p:spPr>
-          <a:xfrm>
-            <a:off x="7403174" y="4953925"/>
-            <a:ext cx="1575999" cy="115750"/>
-          </a:xfrm>
-          <a:prstGeom prst="rect">
-            <a:avLst/>
-          </a:prstGeom>
-          <a:noFill/>
-          <a:ln>
-            <a:noFill/>
-          </a:ln>
-        </p:spPr>
-      </p:pic>
-      <p:pic>
-        <p:nvPicPr>
-          <p:cNvPr id="153" name="Google Shape;153;p21"/>
-          <p:cNvPicPr preferRelativeResize="0"/>
-          <p:nvPr/>
-        </p:nvPicPr>
-        <p:blipFill>
-          <a:blip r:embed="rId5">
-            <a:alphaModFix/>
-          </a:blip>
-          <a:stretch>
-            <a:fillRect/>
-          </a:stretch>
-        </p:blipFill>
-        <p:spPr>
-          <a:xfrm>
-            <a:off x="87850" y="4931817"/>
-            <a:ext cx="1073603" cy="159974"/>
           </a:xfrm>
           <a:prstGeom prst="rect">
             <a:avLst/>

</xml_diff>